<commit_message>
Added bit about model prediction
</commit_message>
<xml_diff>
--- a/Credit Card Fraud Detection.pptx
+++ b/Credit Card Fraud Detection.pptx
@@ -5,7 +5,7 @@
     <p:sldMasterId id="2147483659" r:id="rId1"/>
   </p:sldMasterIdLst>
   <p:notesMasterIdLst>
-    <p:notesMasterId r:id="rId16"/>
+    <p:notesMasterId r:id="rId17"/>
   </p:notesMasterIdLst>
   <p:sldIdLst>
     <p:sldId id="256" r:id="rId2"/>
@@ -18,20 +18,21 @@
     <p:sldId id="262" r:id="rId9"/>
     <p:sldId id="263" r:id="rId10"/>
     <p:sldId id="264" r:id="rId11"/>
-    <p:sldId id="265" r:id="rId12"/>
-    <p:sldId id="266" r:id="rId13"/>
-    <p:sldId id="267" r:id="rId14"/>
-    <p:sldId id="268" r:id="rId15"/>
+    <p:sldId id="270" r:id="rId12"/>
+    <p:sldId id="265" r:id="rId13"/>
+    <p:sldId id="266" r:id="rId14"/>
+    <p:sldId id="267" r:id="rId15"/>
+    <p:sldId id="268" r:id="rId16"/>
   </p:sldIdLst>
   <p:sldSz cx="12192000" cy="6858000"/>
   <p:notesSz cx="6858000" cy="9144000"/>
   <p:embeddedFontLst>
     <p:embeddedFont>
       <p:font typeface="Urbanist" panose="020B0604020202020204" charset="0"/>
-      <p:regular r:id="rId17"/>
-      <p:bold r:id="rId18"/>
-      <p:italic r:id="rId19"/>
-      <p:boldItalic r:id="rId20"/>
+      <p:regular r:id="rId18"/>
+      <p:bold r:id="rId19"/>
+      <p:italic r:id="rId20"/>
+      <p:boldItalic r:id="rId21"/>
     </p:embeddedFont>
   </p:embeddedFontLst>
   <p:defaultTextStyle>
@@ -12516,6 +12517,189 @@
     <p:bg>
       <p:bgPr>
         <a:solidFill>
+          <a:schemeClr val="tx1"/>
+        </a:solidFill>
+        <a:effectLst/>
+      </p:bgPr>
+    </p:bg>
+    <p:spTree>
+      <p:nvGrpSpPr>
+        <p:cNvPr id="1" name=""/>
+        <p:cNvGrpSpPr/>
+        <p:nvPr/>
+      </p:nvGrpSpPr>
+      <p:grpSpPr>
+        <a:xfrm>
+          <a:off x="0" y="0"/>
+          <a:ext cx="0" cy="0"/>
+          <a:chOff x="0" y="0"/>
+          <a:chExt cx="0" cy="0"/>
+        </a:xfrm>
+      </p:grpSpPr>
+      <p:pic>
+        <p:nvPicPr>
+          <p:cNvPr id="5" name="Picture 4">
+            <a:extLst>
+              <a:ext uri="{FF2B5EF4-FFF2-40B4-BE49-F238E27FC236}">
+                <a16:creationId xmlns:a16="http://schemas.microsoft.com/office/drawing/2014/main" id="{5298A453-E706-6D41-AB13-F18EDB023C41}"/>
+              </a:ext>
+            </a:extLst>
+          </p:cNvPr>
+          <p:cNvPicPr>
+            <a:picLocks noChangeAspect="1"/>
+          </p:cNvPicPr>
+          <p:nvPr/>
+        </p:nvPicPr>
+        <p:blipFill>
+          <a:blip r:embed="rId2"/>
+          <a:stretch>
+            <a:fillRect/>
+          </a:stretch>
+        </p:blipFill>
+        <p:spPr>
+          <a:xfrm>
+            <a:off x="771525" y="2042160"/>
+            <a:ext cx="7305305" cy="3918815"/>
+          </a:xfrm>
+          <a:prstGeom prst="rect">
+            <a:avLst/>
+          </a:prstGeom>
+        </p:spPr>
+      </p:pic>
+      <p:sp>
+        <p:nvSpPr>
+          <p:cNvPr id="7" name="Google Shape;227;p20">
+            <a:extLst>
+              <a:ext uri="{FF2B5EF4-FFF2-40B4-BE49-F238E27FC236}">
+                <a16:creationId xmlns:a16="http://schemas.microsoft.com/office/drawing/2014/main" id="{506C4FCE-25E2-2B0D-53D7-E49C5157F98E}"/>
+              </a:ext>
+            </a:extLst>
+          </p:cNvPr>
+          <p:cNvSpPr txBox="1"/>
+          <p:nvPr/>
+        </p:nvSpPr>
+        <p:spPr>
+          <a:xfrm>
+            <a:off x="771525" y="581025"/>
+            <a:ext cx="11381422" cy="552450"/>
+          </a:xfrm>
+          <a:prstGeom prst="rect">
+            <a:avLst/>
+          </a:prstGeom>
+          <a:noFill/>
+          <a:ln>
+            <a:noFill/>
+          </a:ln>
+        </p:spPr>
+        <p:txBody>
+          <a:bodyPr spcFirstLastPara="1" wrap="square" lIns="0" tIns="0" rIns="0" bIns="0" anchor="t" anchorCtr="0">
+            <a:spAutoFit/>
+          </a:bodyPr>
+          <a:lstStyle/>
+          <a:p>
+            <a:pPr marL="0" marR="0" lvl="0" indent="0" algn="l" rtl="0">
+              <a:spcBef>
+                <a:spcPts val="0"/>
+              </a:spcBef>
+              <a:spcAft>
+                <a:spcPts val="0"/>
+              </a:spcAft>
+              <a:buNone/>
+            </a:pPr>
+            <a:r>
+              <a:rPr lang="en-US" sz="3600" b="1" i="0" u="none" strike="noStrike" cap="none" dirty="0">
+                <a:solidFill>
+                  <a:srgbClr val="FFFFFF"/>
+                </a:solidFill>
+                <a:latin typeface="Urbanist"/>
+                <a:ea typeface="Urbanist"/>
+                <a:cs typeface="Urbanist"/>
+                <a:sym typeface="Urbanist"/>
+              </a:rPr>
+              <a:t>Model Deployment</a:t>
+            </a:r>
+            <a:endParaRPr lang="en-US" dirty="0"/>
+          </a:p>
+        </p:txBody>
+      </p:sp>
+      <p:sp>
+        <p:nvSpPr>
+          <p:cNvPr id="8" name="Google Shape;213;p19">
+            <a:extLst>
+              <a:ext uri="{FF2B5EF4-FFF2-40B4-BE49-F238E27FC236}">
+                <a16:creationId xmlns:a16="http://schemas.microsoft.com/office/drawing/2014/main" id="{7A9D1389-1397-01B2-E9E1-3CAB0B50313C}"/>
+              </a:ext>
+            </a:extLst>
+          </p:cNvPr>
+          <p:cNvSpPr txBox="1"/>
+          <p:nvPr/>
+        </p:nvSpPr>
+        <p:spPr>
+          <a:xfrm>
+            <a:off x="8366760" y="2042160"/>
+            <a:ext cx="3175190" cy="1477328"/>
+          </a:xfrm>
+          <a:prstGeom prst="rect">
+            <a:avLst/>
+          </a:prstGeom>
+          <a:noFill/>
+          <a:ln>
+            <a:noFill/>
+          </a:ln>
+        </p:spPr>
+        <p:txBody>
+          <a:bodyPr spcFirstLastPara="1" wrap="square" lIns="0" tIns="0" rIns="0" bIns="0" anchor="t" anchorCtr="0">
+            <a:spAutoFit/>
+          </a:bodyPr>
+          <a:lstStyle/>
+          <a:p>
+            <a:pPr marL="0" marR="0" lvl="0" indent="0" algn="l" rtl="0">
+              <a:lnSpc>
+                <a:spcPct val="160000"/>
+              </a:lnSpc>
+              <a:spcBef>
+                <a:spcPts val="0"/>
+              </a:spcBef>
+              <a:spcAft>
+                <a:spcPts val="0"/>
+              </a:spcAft>
+              <a:buNone/>
+            </a:pPr>
+            <a:r>
+              <a:rPr lang="en-US" sz="1500" b="0" i="0" u="none" strike="noStrike" cap="none" dirty="0">
+                <a:solidFill>
+                  <a:srgbClr val="CCCCCC"/>
+                </a:solidFill>
+                <a:latin typeface="Urbanist"/>
+                <a:ea typeface="Urbanist"/>
+                <a:cs typeface="Urbanist"/>
+                <a:sym typeface="Urbanist"/>
+              </a:rPr>
+              <a:t>The model can be deployed to see new transactions and act upon it. This is essential in credit card fraud detection.   </a:t>
+            </a:r>
+            <a:endParaRPr lang="en-US" dirty="0"/>
+          </a:p>
+        </p:txBody>
+      </p:sp>
+    </p:spTree>
+    <p:extLst>
+      <p:ext uri="{BB962C8B-B14F-4D97-AF65-F5344CB8AC3E}">
+        <p14:creationId xmlns:p14="http://schemas.microsoft.com/office/powerpoint/2010/main" val="3822274714"/>
+      </p:ext>
+    </p:extLst>
+  </p:cSld>
+  <p:clrMapOvr>
+    <a:masterClrMapping/>
+  </p:clrMapOvr>
+</p:sld>
+</file>
+
+<file path=ppt/slides/slide12.xml><?xml version="1.0" encoding="utf-8"?>
+<p:sld xmlns:a="http://schemas.openxmlformats.org/drawingml/2006/main" xmlns:r="http://schemas.openxmlformats.org/officeDocument/2006/relationships" xmlns:p="http://schemas.openxmlformats.org/presentationml/2006/main">
+  <p:cSld>
+    <p:bg>
+      <p:bgPr>
+        <a:solidFill>
           <a:srgbClr val="000000"/>
         </a:solidFill>
         <a:effectLst/>
@@ -13163,7 +13347,7 @@
 </p:sld>
 </file>
 
-<file path=ppt/slides/slide12.xml><?xml version="1.0" encoding="utf-8"?>
+<file path=ppt/slides/slide13.xml><?xml version="1.0" encoding="utf-8"?>
 <p:sld xmlns:a="http://schemas.openxmlformats.org/drawingml/2006/main" xmlns:r="http://schemas.openxmlformats.org/officeDocument/2006/relationships" xmlns:p="http://schemas.openxmlformats.org/presentationml/2006/main">
   <p:cSld>
     <p:spTree>
@@ -13318,7 +13502,7 @@
 </p:sld>
 </file>
 
-<file path=ppt/slides/slide13.xml><?xml version="1.0" encoding="utf-8"?>
+<file path=ppt/slides/slide14.xml><?xml version="1.0" encoding="utf-8"?>
 <p:sld xmlns:a="http://schemas.openxmlformats.org/drawingml/2006/main" xmlns:r="http://schemas.openxmlformats.org/officeDocument/2006/relationships" xmlns:p="http://schemas.openxmlformats.org/presentationml/2006/main">
   <p:cSld>
     <p:bg>
@@ -13481,7 +13665,7 @@
 </p:sld>
 </file>
 
-<file path=ppt/slides/slide14.xml><?xml version="1.0" encoding="utf-8"?>
+<file path=ppt/slides/slide15.xml><?xml version="1.0" encoding="utf-8"?>
 <p:sld xmlns:a="http://schemas.openxmlformats.org/drawingml/2006/main" xmlns:r="http://schemas.openxmlformats.org/officeDocument/2006/relationships" xmlns:p="http://schemas.openxmlformats.org/presentationml/2006/main">
   <p:cSld>
     <p:bg>
@@ -21349,7 +21533,7 @@
               <a:buNone/>
             </a:pPr>
             <a:r>
-              <a:rPr lang="en-US" sz="3600" b="1" i="0" u="none" strike="noStrike" cap="none">
+              <a:rPr lang="en-US" sz="3600" b="1" i="0" u="none" strike="noStrike" cap="none" dirty="0">
                 <a:solidFill>
                   <a:srgbClr val="FFFFFF"/>
                 </a:solidFill>
@@ -21360,7 +21544,7 @@
               </a:rPr>
               <a:t>Confusion Matrix Analysis</a:t>
             </a:r>
-            <a:endParaRPr/>
+            <a:endParaRPr dirty="0"/>
           </a:p>
         </p:txBody>
       </p:sp>

</xml_diff>